<commit_message>
after class 0405, before splitting mouse function
</commit_message>
<xml_diff>
--- a/week-10-in-class/screenshots.pptx
+++ b/week-10-in-class/screenshots.pptx
@@ -7,6 +7,7 @@
   <p:sldIdLst>
     <p:sldId id="256" r:id="rId2"/>
     <p:sldId id="257" r:id="rId3"/>
+    <p:sldId id="258" r:id="rId4"/>
   </p:sldIdLst>
   <p:sldSz cx="9144000" cy="6858000" type="screen4x3"/>
   <p:notesSz cx="6858000" cy="9144000"/>
@@ -289,7 +290,7 @@
           <a:p>
             <a:fld id="{174827A2-23A4-41F3-BD78-642B36115464}" type="datetimeFigureOut">
               <a:rPr lang="en-US" smtClean="0"/>
-              <a:t>3/24/2016</a:t>
+              <a:t>3/29/2016</a:t>
             </a:fld>
             <a:endParaRPr lang="en-US"/>
           </a:p>
@@ -459,7 +460,7 @@
           <a:p>
             <a:fld id="{174827A2-23A4-41F3-BD78-642B36115464}" type="datetimeFigureOut">
               <a:rPr lang="en-US" smtClean="0"/>
-              <a:t>3/24/2016</a:t>
+              <a:t>3/29/2016</a:t>
             </a:fld>
             <a:endParaRPr lang="en-US"/>
           </a:p>
@@ -639,7 +640,7 @@
           <a:p>
             <a:fld id="{174827A2-23A4-41F3-BD78-642B36115464}" type="datetimeFigureOut">
               <a:rPr lang="en-US" smtClean="0"/>
-              <a:t>3/24/2016</a:t>
+              <a:t>3/29/2016</a:t>
             </a:fld>
             <a:endParaRPr lang="en-US"/>
           </a:p>
@@ -809,7 +810,7 @@
           <a:p>
             <a:fld id="{174827A2-23A4-41F3-BD78-642B36115464}" type="datetimeFigureOut">
               <a:rPr lang="en-US" smtClean="0"/>
-              <a:t>3/24/2016</a:t>
+              <a:t>3/29/2016</a:t>
             </a:fld>
             <a:endParaRPr lang="en-US"/>
           </a:p>
@@ -1055,7 +1056,7 @@
           <a:p>
             <a:fld id="{174827A2-23A4-41F3-BD78-642B36115464}" type="datetimeFigureOut">
               <a:rPr lang="en-US" smtClean="0"/>
-              <a:t>3/24/2016</a:t>
+              <a:t>3/29/2016</a:t>
             </a:fld>
             <a:endParaRPr lang="en-US"/>
           </a:p>
@@ -1343,7 +1344,7 @@
           <a:p>
             <a:fld id="{174827A2-23A4-41F3-BD78-642B36115464}" type="datetimeFigureOut">
               <a:rPr lang="en-US" smtClean="0"/>
-              <a:t>3/24/2016</a:t>
+              <a:t>3/29/2016</a:t>
             </a:fld>
             <a:endParaRPr lang="en-US"/>
           </a:p>
@@ -1765,7 +1766,7 @@
           <a:p>
             <a:fld id="{174827A2-23A4-41F3-BD78-642B36115464}" type="datetimeFigureOut">
               <a:rPr lang="en-US" smtClean="0"/>
-              <a:t>3/24/2016</a:t>
+              <a:t>3/29/2016</a:t>
             </a:fld>
             <a:endParaRPr lang="en-US"/>
           </a:p>
@@ -1883,7 +1884,7 @@
           <a:p>
             <a:fld id="{174827A2-23A4-41F3-BD78-642B36115464}" type="datetimeFigureOut">
               <a:rPr lang="en-US" smtClean="0"/>
-              <a:t>3/24/2016</a:t>
+              <a:t>3/29/2016</a:t>
             </a:fld>
             <a:endParaRPr lang="en-US"/>
           </a:p>
@@ -1978,7 +1979,7 @@
           <a:p>
             <a:fld id="{174827A2-23A4-41F3-BD78-642B36115464}" type="datetimeFigureOut">
               <a:rPr lang="en-US" smtClean="0"/>
-              <a:t>3/24/2016</a:t>
+              <a:t>3/29/2016</a:t>
             </a:fld>
             <a:endParaRPr lang="en-US"/>
           </a:p>
@@ -2255,7 +2256,7 @@
           <a:p>
             <a:fld id="{174827A2-23A4-41F3-BD78-642B36115464}" type="datetimeFigureOut">
               <a:rPr lang="en-US" smtClean="0"/>
-              <a:t>3/24/2016</a:t>
+              <a:t>3/29/2016</a:t>
             </a:fld>
             <a:endParaRPr lang="en-US"/>
           </a:p>
@@ -2508,7 +2509,7 @@
           <a:p>
             <a:fld id="{174827A2-23A4-41F3-BD78-642B36115464}" type="datetimeFigureOut">
               <a:rPr lang="en-US" smtClean="0"/>
-              <a:t>3/24/2016</a:t>
+              <a:t>3/29/2016</a:t>
             </a:fld>
             <a:endParaRPr lang="en-US"/>
           </a:p>
@@ -2721,7 +2722,7 @@
           <a:p>
             <a:fld id="{174827A2-23A4-41F3-BD78-642B36115464}" type="datetimeFigureOut">
               <a:rPr lang="en-US" smtClean="0"/>
-              <a:t>3/24/2016</a:t>
+              <a:t>3/29/2016</a:t>
             </a:fld>
             <a:endParaRPr lang="en-US"/>
           </a:p>
@@ -3314,6 +3315,128 @@
     <p:extLst>
       <p:ext uri="{BB962C8B-B14F-4D97-AF65-F5344CB8AC3E}">
         <p14:creationId xmlns:p14="http://schemas.microsoft.com/office/powerpoint/2010/main" val="2740220806"/>
+      </p:ext>
+    </p:extLst>
+  </p:cSld>
+  <p:clrMapOvr>
+    <a:masterClrMapping/>
+  </p:clrMapOvr>
+</p:sld>
+</file>
+
+<file path=ppt/slides/slide3.xml><?xml version="1.0" encoding="utf-8"?>
+<p:sld xmlns:a="http://schemas.openxmlformats.org/drawingml/2006/main" xmlns:r="http://schemas.openxmlformats.org/officeDocument/2006/relationships" xmlns:p="http://schemas.openxmlformats.org/presentationml/2006/main">
+  <p:cSld>
+    <p:spTree>
+      <p:nvGrpSpPr>
+        <p:cNvPr id="1" name=""/>
+        <p:cNvGrpSpPr/>
+        <p:nvPr/>
+      </p:nvGrpSpPr>
+      <p:grpSpPr>
+        <a:xfrm>
+          <a:off x="0" y="0"/>
+          <a:ext cx="0" cy="0"/>
+          <a:chOff x="0" y="0"/>
+          <a:chExt cx="0" cy="0"/>
+        </a:xfrm>
+      </p:grpSpPr>
+      <p:sp>
+        <p:nvSpPr>
+          <p:cNvPr id="2" name="Title 1"/>
+          <p:cNvSpPr>
+            <a:spLocks noGrp="1"/>
+          </p:cNvSpPr>
+          <p:nvPr>
+            <p:ph type="title"/>
+          </p:nvPr>
+        </p:nvSpPr>
+        <p:spPr/>
+        <p:txBody>
+          <a:bodyPr/>
+          <a:lstStyle/>
+          <a:p>
+            <a:endParaRPr lang="en-US"/>
+          </a:p>
+        </p:txBody>
+      </p:sp>
+      <p:sp>
+        <p:nvSpPr>
+          <p:cNvPr id="3" name="Content Placeholder 2"/>
+          <p:cNvSpPr>
+            <a:spLocks noGrp="1"/>
+          </p:cNvSpPr>
+          <p:nvPr>
+            <p:ph idx="1"/>
+          </p:nvPr>
+        </p:nvSpPr>
+        <p:spPr/>
+        <p:txBody>
+          <a:bodyPr/>
+          <a:lstStyle/>
+          <a:p>
+            <a:endParaRPr lang="en-US"/>
+          </a:p>
+        </p:txBody>
+      </p:sp>
+      <p:pic>
+        <p:nvPicPr>
+          <p:cNvPr id="1026" name="Picture 2"/>
+          <p:cNvPicPr>
+            <a:picLocks noChangeAspect="1" noChangeArrowheads="1"/>
+          </p:cNvPicPr>
+          <p:nvPr/>
+        </p:nvPicPr>
+        <p:blipFill>
+          <a:blip r:embed="rId2">
+            <a:extLst>
+              <a:ext uri="{28A0092B-C50C-407E-A947-70E740481C1C}">
+                <a14:useLocalDpi xmlns:a14="http://schemas.microsoft.com/office/drawing/2010/main" val="0"/>
+              </a:ext>
+            </a:extLst>
+          </a:blip>
+          <a:srcRect/>
+          <a:stretch>
+            <a:fillRect/>
+          </a:stretch>
+        </p:blipFill>
+        <p:spPr bwMode="auto">
+          <a:xfrm>
+            <a:off x="0" y="0"/>
+            <a:ext cx="13011150" cy="7315200"/>
+          </a:xfrm>
+          <a:prstGeom prst="rect">
+            <a:avLst/>
+          </a:prstGeom>
+          <a:noFill/>
+          <a:ln>
+            <a:noFill/>
+          </a:ln>
+          <a:extLst>
+            <a:ext uri="{909E8E84-426E-40DD-AFC4-6F175D3DCCD1}">
+              <a14:hiddenFill xmlns:a14="http://schemas.microsoft.com/office/drawing/2010/main">
+                <a:solidFill>
+                  <a:schemeClr val="accent1"/>
+                </a:solidFill>
+              </a14:hiddenFill>
+            </a:ext>
+            <a:ext uri="{91240B29-F687-4F45-9708-019B960494DF}">
+              <a14:hiddenLine xmlns:a14="http://schemas.microsoft.com/office/drawing/2010/main" w="9525">
+                <a:solidFill>
+                  <a:schemeClr val="tx1"/>
+                </a:solidFill>
+                <a:miter lim="800000"/>
+                <a:headEnd/>
+                <a:tailEnd/>
+              </a14:hiddenLine>
+            </a:ext>
+          </a:extLst>
+        </p:spPr>
+      </p:pic>
+    </p:spTree>
+    <p:extLst>
+      <p:ext uri="{BB962C8B-B14F-4D97-AF65-F5344CB8AC3E}">
+        <p14:creationId xmlns:p14="http://schemas.microsoft.com/office/powerpoint/2010/main" val="4036954899"/>
       </p:ext>
     </p:extLst>
   </p:cSld>

</xml_diff>

<commit_message>
final cleanup and comments
</commit_message>
<xml_diff>
--- a/week-10-in-class/screenshots.pptx
+++ b/week-10-in-class/screenshots.pptx
@@ -8,6 +8,9 @@
     <p:sldId id="256" r:id="rId2"/>
     <p:sldId id="257" r:id="rId3"/>
     <p:sldId id="258" r:id="rId4"/>
+    <p:sldId id="259" r:id="rId5"/>
+    <p:sldId id="260" r:id="rId6"/>
+    <p:sldId id="261" r:id="rId7"/>
   </p:sldIdLst>
   <p:sldSz cx="9144000" cy="6858000" type="screen4x3"/>
   <p:notesSz cx="6858000" cy="9144000"/>
@@ -290,7 +293,7 @@
           <a:p>
             <a:fld id="{174827A2-23A4-41F3-BD78-642B36115464}" type="datetimeFigureOut">
               <a:rPr lang="en-US" smtClean="0"/>
-              <a:t>3/29/2016</a:t>
+              <a:t>4/14/2016</a:t>
             </a:fld>
             <a:endParaRPr lang="en-US"/>
           </a:p>
@@ -460,7 +463,7 @@
           <a:p>
             <a:fld id="{174827A2-23A4-41F3-BD78-642B36115464}" type="datetimeFigureOut">
               <a:rPr lang="en-US" smtClean="0"/>
-              <a:t>3/29/2016</a:t>
+              <a:t>4/14/2016</a:t>
             </a:fld>
             <a:endParaRPr lang="en-US"/>
           </a:p>
@@ -640,7 +643,7 @@
           <a:p>
             <a:fld id="{174827A2-23A4-41F3-BD78-642B36115464}" type="datetimeFigureOut">
               <a:rPr lang="en-US" smtClean="0"/>
-              <a:t>3/29/2016</a:t>
+              <a:t>4/14/2016</a:t>
             </a:fld>
             <a:endParaRPr lang="en-US"/>
           </a:p>
@@ -810,7 +813,7 @@
           <a:p>
             <a:fld id="{174827A2-23A4-41F3-BD78-642B36115464}" type="datetimeFigureOut">
               <a:rPr lang="en-US" smtClean="0"/>
-              <a:t>3/29/2016</a:t>
+              <a:t>4/14/2016</a:t>
             </a:fld>
             <a:endParaRPr lang="en-US"/>
           </a:p>
@@ -1056,7 +1059,7 @@
           <a:p>
             <a:fld id="{174827A2-23A4-41F3-BD78-642B36115464}" type="datetimeFigureOut">
               <a:rPr lang="en-US" smtClean="0"/>
-              <a:t>3/29/2016</a:t>
+              <a:t>4/14/2016</a:t>
             </a:fld>
             <a:endParaRPr lang="en-US"/>
           </a:p>
@@ -1344,7 +1347,7 @@
           <a:p>
             <a:fld id="{174827A2-23A4-41F3-BD78-642B36115464}" type="datetimeFigureOut">
               <a:rPr lang="en-US" smtClean="0"/>
-              <a:t>3/29/2016</a:t>
+              <a:t>4/14/2016</a:t>
             </a:fld>
             <a:endParaRPr lang="en-US"/>
           </a:p>
@@ -1766,7 +1769,7 @@
           <a:p>
             <a:fld id="{174827A2-23A4-41F3-BD78-642B36115464}" type="datetimeFigureOut">
               <a:rPr lang="en-US" smtClean="0"/>
-              <a:t>3/29/2016</a:t>
+              <a:t>4/14/2016</a:t>
             </a:fld>
             <a:endParaRPr lang="en-US"/>
           </a:p>
@@ -1884,7 +1887,7 @@
           <a:p>
             <a:fld id="{174827A2-23A4-41F3-BD78-642B36115464}" type="datetimeFigureOut">
               <a:rPr lang="en-US" smtClean="0"/>
-              <a:t>3/29/2016</a:t>
+              <a:t>4/14/2016</a:t>
             </a:fld>
             <a:endParaRPr lang="en-US"/>
           </a:p>
@@ -1979,7 +1982,7 @@
           <a:p>
             <a:fld id="{174827A2-23A4-41F3-BD78-642B36115464}" type="datetimeFigureOut">
               <a:rPr lang="en-US" smtClean="0"/>
-              <a:t>3/29/2016</a:t>
+              <a:t>4/14/2016</a:t>
             </a:fld>
             <a:endParaRPr lang="en-US"/>
           </a:p>
@@ -2256,7 +2259,7 @@
           <a:p>
             <a:fld id="{174827A2-23A4-41F3-BD78-642B36115464}" type="datetimeFigureOut">
               <a:rPr lang="en-US" smtClean="0"/>
-              <a:t>3/29/2016</a:t>
+              <a:t>4/14/2016</a:t>
             </a:fld>
             <a:endParaRPr lang="en-US"/>
           </a:p>
@@ -2509,7 +2512,7 @@
           <a:p>
             <a:fld id="{174827A2-23A4-41F3-BD78-642B36115464}" type="datetimeFigureOut">
               <a:rPr lang="en-US" smtClean="0"/>
-              <a:t>3/29/2016</a:t>
+              <a:t>4/14/2016</a:t>
             </a:fld>
             <a:endParaRPr lang="en-US"/>
           </a:p>
@@ -2722,7 +2725,7 @@
           <a:p>
             <a:fld id="{174827A2-23A4-41F3-BD78-642B36115464}" type="datetimeFigureOut">
               <a:rPr lang="en-US" smtClean="0"/>
-              <a:t>3/29/2016</a:t>
+              <a:t>4/14/2016</a:t>
             </a:fld>
             <a:endParaRPr lang="en-US"/>
           </a:p>
@@ -3437,6 +3440,372 @@
     <p:extLst>
       <p:ext uri="{BB962C8B-B14F-4D97-AF65-F5344CB8AC3E}">
         <p14:creationId xmlns:p14="http://schemas.microsoft.com/office/powerpoint/2010/main" val="4036954899"/>
+      </p:ext>
+    </p:extLst>
+  </p:cSld>
+  <p:clrMapOvr>
+    <a:masterClrMapping/>
+  </p:clrMapOvr>
+</p:sld>
+</file>
+
+<file path=ppt/slides/slide4.xml><?xml version="1.0" encoding="utf-8"?>
+<p:sld xmlns:a="http://schemas.openxmlformats.org/drawingml/2006/main" xmlns:r="http://schemas.openxmlformats.org/officeDocument/2006/relationships" xmlns:p="http://schemas.openxmlformats.org/presentationml/2006/main">
+  <p:cSld>
+    <p:spTree>
+      <p:nvGrpSpPr>
+        <p:cNvPr id="1" name=""/>
+        <p:cNvGrpSpPr/>
+        <p:nvPr/>
+      </p:nvGrpSpPr>
+      <p:grpSpPr>
+        <a:xfrm>
+          <a:off x="0" y="0"/>
+          <a:ext cx="0" cy="0"/>
+          <a:chOff x="0" y="0"/>
+          <a:chExt cx="0" cy="0"/>
+        </a:xfrm>
+      </p:grpSpPr>
+      <p:sp>
+        <p:nvSpPr>
+          <p:cNvPr id="2" name="Title 1"/>
+          <p:cNvSpPr>
+            <a:spLocks noGrp="1"/>
+          </p:cNvSpPr>
+          <p:nvPr>
+            <p:ph type="title"/>
+          </p:nvPr>
+        </p:nvSpPr>
+        <p:spPr/>
+        <p:txBody>
+          <a:bodyPr/>
+          <a:lstStyle/>
+          <a:p>
+            <a:endParaRPr lang="en-US"/>
+          </a:p>
+        </p:txBody>
+      </p:sp>
+      <p:sp>
+        <p:nvSpPr>
+          <p:cNvPr id="3" name="Content Placeholder 2"/>
+          <p:cNvSpPr>
+            <a:spLocks noGrp="1"/>
+          </p:cNvSpPr>
+          <p:nvPr>
+            <p:ph idx="1"/>
+          </p:nvPr>
+        </p:nvSpPr>
+        <p:spPr/>
+        <p:txBody>
+          <a:bodyPr/>
+          <a:lstStyle/>
+          <a:p>
+            <a:endParaRPr lang="en-US"/>
+          </a:p>
+        </p:txBody>
+      </p:sp>
+      <p:pic>
+        <p:nvPicPr>
+          <p:cNvPr id="1026" name="Picture 2"/>
+          <p:cNvPicPr>
+            <a:picLocks noChangeAspect="1" noChangeArrowheads="1"/>
+          </p:cNvPicPr>
+          <p:nvPr/>
+        </p:nvPicPr>
+        <p:blipFill>
+          <a:blip r:embed="rId2">
+            <a:extLst>
+              <a:ext uri="{28A0092B-C50C-407E-A947-70E740481C1C}">
+                <a14:useLocalDpi xmlns:a14="http://schemas.microsoft.com/office/drawing/2010/main" val="0"/>
+              </a:ext>
+            </a:extLst>
+          </a:blip>
+          <a:srcRect/>
+          <a:stretch>
+            <a:fillRect/>
+          </a:stretch>
+        </p:blipFill>
+        <p:spPr bwMode="auto">
+          <a:xfrm>
+            <a:off x="0" y="0"/>
+            <a:ext cx="13011150" cy="7315200"/>
+          </a:xfrm>
+          <a:prstGeom prst="rect">
+            <a:avLst/>
+          </a:prstGeom>
+          <a:noFill/>
+          <a:ln>
+            <a:noFill/>
+          </a:ln>
+          <a:extLst>
+            <a:ext uri="{909E8E84-426E-40DD-AFC4-6F175D3DCCD1}">
+              <a14:hiddenFill xmlns:a14="http://schemas.microsoft.com/office/drawing/2010/main">
+                <a:solidFill>
+                  <a:schemeClr val="accent1"/>
+                </a:solidFill>
+              </a14:hiddenFill>
+            </a:ext>
+            <a:ext uri="{91240B29-F687-4F45-9708-019B960494DF}">
+              <a14:hiddenLine xmlns:a14="http://schemas.microsoft.com/office/drawing/2010/main" w="9525">
+                <a:solidFill>
+                  <a:schemeClr val="tx1"/>
+                </a:solidFill>
+                <a:miter lim="800000"/>
+                <a:headEnd/>
+                <a:tailEnd/>
+              </a14:hiddenLine>
+            </a:ext>
+          </a:extLst>
+        </p:spPr>
+      </p:pic>
+    </p:spTree>
+    <p:extLst>
+      <p:ext uri="{BB962C8B-B14F-4D97-AF65-F5344CB8AC3E}">
+        <p14:creationId xmlns:p14="http://schemas.microsoft.com/office/powerpoint/2010/main" val="3619025966"/>
+      </p:ext>
+    </p:extLst>
+  </p:cSld>
+  <p:clrMapOvr>
+    <a:masterClrMapping/>
+  </p:clrMapOvr>
+</p:sld>
+</file>
+
+<file path=ppt/slides/slide5.xml><?xml version="1.0" encoding="utf-8"?>
+<p:sld xmlns:a="http://schemas.openxmlformats.org/drawingml/2006/main" xmlns:r="http://schemas.openxmlformats.org/officeDocument/2006/relationships" xmlns:p="http://schemas.openxmlformats.org/presentationml/2006/main">
+  <p:cSld>
+    <p:spTree>
+      <p:nvGrpSpPr>
+        <p:cNvPr id="1" name=""/>
+        <p:cNvGrpSpPr/>
+        <p:nvPr/>
+      </p:nvGrpSpPr>
+      <p:grpSpPr>
+        <a:xfrm>
+          <a:off x="0" y="0"/>
+          <a:ext cx="0" cy="0"/>
+          <a:chOff x="0" y="0"/>
+          <a:chExt cx="0" cy="0"/>
+        </a:xfrm>
+      </p:grpSpPr>
+      <p:sp>
+        <p:nvSpPr>
+          <p:cNvPr id="2" name="Title 1"/>
+          <p:cNvSpPr>
+            <a:spLocks noGrp="1"/>
+          </p:cNvSpPr>
+          <p:nvPr>
+            <p:ph type="title"/>
+          </p:nvPr>
+        </p:nvSpPr>
+        <p:spPr/>
+        <p:txBody>
+          <a:bodyPr/>
+          <a:lstStyle/>
+          <a:p>
+            <a:endParaRPr lang="en-US"/>
+          </a:p>
+        </p:txBody>
+      </p:sp>
+      <p:sp>
+        <p:nvSpPr>
+          <p:cNvPr id="3" name="Content Placeholder 2"/>
+          <p:cNvSpPr>
+            <a:spLocks noGrp="1"/>
+          </p:cNvSpPr>
+          <p:nvPr>
+            <p:ph idx="1"/>
+          </p:nvPr>
+        </p:nvSpPr>
+        <p:spPr/>
+        <p:txBody>
+          <a:bodyPr/>
+          <a:lstStyle/>
+          <a:p>
+            <a:endParaRPr lang="en-US"/>
+          </a:p>
+        </p:txBody>
+      </p:sp>
+      <p:pic>
+        <p:nvPicPr>
+          <p:cNvPr id="2050" name="Picture 2"/>
+          <p:cNvPicPr>
+            <a:picLocks noChangeAspect="1" noChangeArrowheads="1"/>
+          </p:cNvPicPr>
+          <p:nvPr/>
+        </p:nvPicPr>
+        <p:blipFill>
+          <a:blip r:embed="rId2">
+            <a:extLst>
+              <a:ext uri="{28A0092B-C50C-407E-A947-70E740481C1C}">
+                <a14:useLocalDpi xmlns:a14="http://schemas.microsoft.com/office/drawing/2010/main" val="0"/>
+              </a:ext>
+            </a:extLst>
+          </a:blip>
+          <a:srcRect/>
+          <a:stretch>
+            <a:fillRect/>
+          </a:stretch>
+        </p:blipFill>
+        <p:spPr bwMode="auto">
+          <a:xfrm>
+            <a:off x="0" y="0"/>
+            <a:ext cx="13011150" cy="7315200"/>
+          </a:xfrm>
+          <a:prstGeom prst="rect">
+            <a:avLst/>
+          </a:prstGeom>
+          <a:noFill/>
+          <a:ln>
+            <a:noFill/>
+          </a:ln>
+          <a:extLst>
+            <a:ext uri="{909E8E84-426E-40DD-AFC4-6F175D3DCCD1}">
+              <a14:hiddenFill xmlns:a14="http://schemas.microsoft.com/office/drawing/2010/main">
+                <a:solidFill>
+                  <a:schemeClr val="accent1"/>
+                </a:solidFill>
+              </a14:hiddenFill>
+            </a:ext>
+            <a:ext uri="{91240B29-F687-4F45-9708-019B960494DF}">
+              <a14:hiddenLine xmlns:a14="http://schemas.microsoft.com/office/drawing/2010/main" w="9525">
+                <a:solidFill>
+                  <a:schemeClr val="tx1"/>
+                </a:solidFill>
+                <a:miter lim="800000"/>
+                <a:headEnd/>
+                <a:tailEnd/>
+              </a14:hiddenLine>
+            </a:ext>
+          </a:extLst>
+        </p:spPr>
+      </p:pic>
+    </p:spTree>
+    <p:extLst>
+      <p:ext uri="{BB962C8B-B14F-4D97-AF65-F5344CB8AC3E}">
+        <p14:creationId xmlns:p14="http://schemas.microsoft.com/office/powerpoint/2010/main" val="3574976115"/>
+      </p:ext>
+    </p:extLst>
+  </p:cSld>
+  <p:clrMapOvr>
+    <a:masterClrMapping/>
+  </p:clrMapOvr>
+</p:sld>
+</file>
+
+<file path=ppt/slides/slide6.xml><?xml version="1.0" encoding="utf-8"?>
+<p:sld xmlns:a="http://schemas.openxmlformats.org/drawingml/2006/main" xmlns:r="http://schemas.openxmlformats.org/officeDocument/2006/relationships" xmlns:p="http://schemas.openxmlformats.org/presentationml/2006/main">
+  <p:cSld>
+    <p:spTree>
+      <p:nvGrpSpPr>
+        <p:cNvPr id="1" name=""/>
+        <p:cNvGrpSpPr/>
+        <p:nvPr/>
+      </p:nvGrpSpPr>
+      <p:grpSpPr>
+        <a:xfrm>
+          <a:off x="0" y="0"/>
+          <a:ext cx="0" cy="0"/>
+          <a:chOff x="0" y="0"/>
+          <a:chExt cx="0" cy="0"/>
+        </a:xfrm>
+      </p:grpSpPr>
+      <p:sp>
+        <p:nvSpPr>
+          <p:cNvPr id="2" name="Title 1"/>
+          <p:cNvSpPr>
+            <a:spLocks noGrp="1"/>
+          </p:cNvSpPr>
+          <p:nvPr>
+            <p:ph type="title"/>
+          </p:nvPr>
+        </p:nvSpPr>
+        <p:spPr/>
+        <p:txBody>
+          <a:bodyPr/>
+          <a:lstStyle/>
+          <a:p>
+            <a:endParaRPr lang="en-US"/>
+          </a:p>
+        </p:txBody>
+      </p:sp>
+      <p:sp>
+        <p:nvSpPr>
+          <p:cNvPr id="3" name="Content Placeholder 2"/>
+          <p:cNvSpPr>
+            <a:spLocks noGrp="1"/>
+          </p:cNvSpPr>
+          <p:nvPr>
+            <p:ph idx="1"/>
+          </p:nvPr>
+        </p:nvSpPr>
+        <p:spPr/>
+        <p:txBody>
+          <a:bodyPr/>
+          <a:lstStyle/>
+          <a:p>
+            <a:endParaRPr lang="en-US"/>
+          </a:p>
+        </p:txBody>
+      </p:sp>
+      <p:pic>
+        <p:nvPicPr>
+          <p:cNvPr id="3074" name="Picture 2"/>
+          <p:cNvPicPr>
+            <a:picLocks noChangeAspect="1" noChangeArrowheads="1"/>
+          </p:cNvPicPr>
+          <p:nvPr/>
+        </p:nvPicPr>
+        <p:blipFill>
+          <a:blip r:embed="rId2">
+            <a:extLst>
+              <a:ext uri="{28A0092B-C50C-407E-A947-70E740481C1C}">
+                <a14:useLocalDpi xmlns:a14="http://schemas.microsoft.com/office/drawing/2010/main" val="0"/>
+              </a:ext>
+            </a:extLst>
+          </a:blip>
+          <a:srcRect/>
+          <a:stretch>
+            <a:fillRect/>
+          </a:stretch>
+        </p:blipFill>
+        <p:spPr bwMode="auto">
+          <a:xfrm>
+            <a:off x="0" y="0"/>
+            <a:ext cx="13011150" cy="7315200"/>
+          </a:xfrm>
+          <a:prstGeom prst="rect">
+            <a:avLst/>
+          </a:prstGeom>
+          <a:noFill/>
+          <a:ln>
+            <a:noFill/>
+          </a:ln>
+          <a:extLst>
+            <a:ext uri="{909E8E84-426E-40DD-AFC4-6F175D3DCCD1}">
+              <a14:hiddenFill xmlns:a14="http://schemas.microsoft.com/office/drawing/2010/main">
+                <a:solidFill>
+                  <a:schemeClr val="accent1"/>
+                </a:solidFill>
+              </a14:hiddenFill>
+            </a:ext>
+            <a:ext uri="{91240B29-F687-4F45-9708-019B960494DF}">
+              <a14:hiddenLine xmlns:a14="http://schemas.microsoft.com/office/drawing/2010/main" w="9525">
+                <a:solidFill>
+                  <a:schemeClr val="tx1"/>
+                </a:solidFill>
+                <a:miter lim="800000"/>
+                <a:headEnd/>
+                <a:tailEnd/>
+              </a14:hiddenLine>
+            </a:ext>
+          </a:extLst>
+        </p:spPr>
+      </p:pic>
+    </p:spTree>
+    <p:extLst>
+      <p:ext uri="{BB962C8B-B14F-4D97-AF65-F5344CB8AC3E}">
+        <p14:creationId xmlns:p14="http://schemas.microsoft.com/office/powerpoint/2010/main" val="2879353312"/>
       </p:ext>
     </p:extLst>
   </p:cSld>

</xml_diff>